<commit_message>
slight chagne to the presentation
</commit_message>
<xml_diff>
--- a/docs_like_prosals/Capstone2025.pptx
+++ b/docs_like_prosals/Capstone2025.pptx
@@ -3525,7 +3525,7 @@
           <a:p>
             <a:fld id="{762B48F5-BACC-47D6-A0F7-82FBF9C6BC85}" type="datetimeFigureOut">
               <a:rPr lang="en-US"/>
-              <a:t>10/7/2025</a:t>
+              <a:t>10/8/2025</a:t>
             </a:fld>
             <a:endParaRPr/>
           </a:p>
@@ -3690,7 +3690,7 @@
           <a:p>
             <a:fld id="{0CB1CD00-5424-4675-AB18-2C419B060449}" type="datetimeFigureOut">
               <a:rPr lang="en-US"/>
-              <a:t>10/7/2025</a:t>
+              <a:t>10/8/2025</a:t>
             </a:fld>
             <a:endParaRPr/>
           </a:p>
@@ -4335,7 +4335,7 @@
           <a:p>
             <a:fld id="{37CC0096-1860-4642-9CD2-0079EA5E7CD1}" type="datetimeFigureOut">
               <a:rPr lang="en-US" smtClean="0"/>
-              <a:t>10/7/2025</a:t>
+              <a:t>10/8/2025</a:t>
             </a:fld>
             <a:endParaRPr lang="en-US"/>
           </a:p>
@@ -4514,7 +4514,7 @@
           <a:p>
             <a:fld id="{37CC0096-1860-4642-9CD2-0079EA5E7CD1}" type="datetimeFigureOut">
               <a:rPr lang="en-US" smtClean="0"/>
-              <a:t>10/7/2025</a:t>
+              <a:t>10/8/2025</a:t>
             </a:fld>
             <a:endParaRPr lang="en-US"/>
           </a:p>
@@ -4687,7 +4687,7 @@
           <a:p>
             <a:fld id="{37CC0096-1860-4642-9CD2-0079EA5E7CD1}" type="datetimeFigureOut">
               <a:rPr lang="en-US" smtClean="0"/>
-              <a:t>10/7/2025</a:t>
+              <a:t>10/8/2025</a:t>
             </a:fld>
             <a:endParaRPr lang="en-US"/>
           </a:p>
@@ -5120,7 +5120,7 @@
           <a:p>
             <a:fld id="{37CC0096-1860-4642-9CD2-0079EA5E7CD1}" type="datetimeFigureOut">
               <a:rPr lang="en-US" smtClean="0"/>
-              <a:t>10/7/2025</a:t>
+              <a:t>10/8/2025</a:t>
             </a:fld>
             <a:endParaRPr lang="en-US"/>
           </a:p>
@@ -5559,7 +5559,7 @@
           <a:p>
             <a:fld id="{37CC0096-1860-4642-9CD2-0079EA5E7CD1}" type="datetimeFigureOut">
               <a:rPr lang="en-US" smtClean="0"/>
-              <a:t>10/7/2025</a:t>
+              <a:t>10/8/2025</a:t>
             </a:fld>
             <a:endParaRPr lang="en-US"/>
           </a:p>
@@ -5676,7 +5676,7 @@
           <a:p>
             <a:fld id="{37CC0096-1860-4642-9CD2-0079EA5E7CD1}" type="datetimeFigureOut">
               <a:rPr lang="en-US" smtClean="0"/>
-              <a:t>10/7/2025</a:t>
+              <a:t>10/8/2025</a:t>
             </a:fld>
             <a:endParaRPr lang="en-US"/>
           </a:p>
@@ -5771,7 +5771,7 @@
           <a:p>
             <a:fld id="{37CC0096-1860-4642-9CD2-0079EA5E7CD1}" type="datetimeFigureOut">
               <a:rPr lang="en-US" smtClean="0"/>
-              <a:t>10/7/2025</a:t>
+              <a:t>10/8/2025</a:t>
             </a:fld>
             <a:endParaRPr lang="en-US"/>
           </a:p>
@@ -6055,7 +6055,7 @@
           <a:p>
             <a:fld id="{37CC0096-1860-4642-9CD2-0079EA5E7CD1}" type="datetimeFigureOut">
               <a:rPr lang="en-US" smtClean="0"/>
-              <a:t>10/7/2025</a:t>
+              <a:t>10/8/2025</a:t>
             </a:fld>
             <a:endParaRPr lang="en-US"/>
           </a:p>
@@ -6366,7 +6366,7 @@
           <a:p>
             <a:fld id="{37CC0096-1860-4642-9CD2-0079EA5E7CD1}" type="datetimeFigureOut">
               <a:rPr lang="en-US" smtClean="0"/>
-              <a:t>10/7/2025</a:t>
+              <a:t>10/8/2025</a:t>
             </a:fld>
             <a:endParaRPr lang="en-US"/>
           </a:p>
@@ -6598,7 +6598,7 @@
             <a:fld id="{37CC0096-1860-4642-9CD2-0079EA5E7CD1}" type="datetimeFigureOut">
               <a:rPr lang="en-US" smtClean="0"/>
               <a:pPr/>
-              <a:t>10/7/2025</a:t>
+              <a:t>10/8/2025</a:t>
             </a:fld>
             <a:endParaRPr lang="en-US"/>
           </a:p>
@@ -7037,7 +7037,7 @@
           <a:p>
             <a:r>
               <a:rPr lang="en-CA" dirty="0"/>
-              <a:t>NYAG</a:t>
+              <a:t>NYAN</a:t>
             </a:r>
             <a:endParaRPr dirty="0"/>
           </a:p>

</xml_diff>